<commit_message>
Update 03.Properties of Pure Substances.pptx
</commit_message>
<xml_diff>
--- a/03.Properties of Pure Substances.pptx
+++ b/03.Properties of Pure Substances.pptx
@@ -14141,8 +14141,8 @@
         </p:nvSpPr>
         <p:spPr>
           <a:xfrm>
-            <a:off x="3908998" y="3551515"/>
-            <a:ext cx="1326004" cy="369332"/>
+            <a:off x="4018003" y="3551515"/>
+            <a:ext cx="1107996" cy="369332"/>
           </a:xfrm>
           <a:prstGeom prst="rect">
             <a:avLst/>
@@ -14168,7 +14168,7 @@
                 </a:solidFill>
                 <a:hlinkClick r:id="rId2"/>
               </a:rPr>
-              <a:t>Example 1</a:t>
+              <a:t>Solution</a:t>
             </a:r>
             <a:endParaRPr lang="en-US" b="1" dirty="0">
               <a:solidFill>
@@ -14363,8 +14363,8 @@
         </p:nvSpPr>
         <p:spPr>
           <a:xfrm>
-            <a:off x="6019800" y="3966383"/>
-            <a:ext cx="1326004" cy="369332"/>
+            <a:off x="6128805" y="3966383"/>
+            <a:ext cx="1107996" cy="369332"/>
           </a:xfrm>
           <a:prstGeom prst="rect">
             <a:avLst/>
@@ -14390,7 +14390,7 @@
                 </a:solidFill>
                 <a:hlinkClick r:id="rId3"/>
               </a:rPr>
-              <a:t>Example 2</a:t>
+              <a:t>Solution</a:t>
             </a:r>
             <a:endParaRPr lang="en-US" b="1" dirty="0">
               <a:solidFill>

</xml_diff>